<commit_message>
Full draft of methods chapter text, missing some references
</commit_message>
<xml_diff>
--- a/Methods/figures/labels.pptx
+++ b/Methods/figures/labels.pptx
@@ -288,7 +288,7 @@
           <a:p>
             <a:fld id="{8A07FD79-AFFA-41E8-B5F0-0BC994AE4396}" type="datetimeFigureOut">
               <a:rPr lang="en-IE" smtClean="0"/>
-              <a:t>23/05/2014</a:t>
+              <a:t>07/10/2014</a:t>
             </a:fld>
             <a:endParaRPr lang="en-IE"/>
           </a:p>
@@ -458,7 +458,7 @@
           <a:p>
             <a:fld id="{8A07FD79-AFFA-41E8-B5F0-0BC994AE4396}" type="datetimeFigureOut">
               <a:rPr lang="en-IE" smtClean="0"/>
-              <a:t>23/05/2014</a:t>
+              <a:t>07/10/2014</a:t>
             </a:fld>
             <a:endParaRPr lang="en-IE"/>
           </a:p>
@@ -638,7 +638,7 @@
           <a:p>
             <a:fld id="{8A07FD79-AFFA-41E8-B5F0-0BC994AE4396}" type="datetimeFigureOut">
               <a:rPr lang="en-IE" smtClean="0"/>
-              <a:t>23/05/2014</a:t>
+              <a:t>07/10/2014</a:t>
             </a:fld>
             <a:endParaRPr lang="en-IE"/>
           </a:p>
@@ -808,7 +808,7 @@
           <a:p>
             <a:fld id="{8A07FD79-AFFA-41E8-B5F0-0BC994AE4396}" type="datetimeFigureOut">
               <a:rPr lang="en-IE" smtClean="0"/>
-              <a:t>23/05/2014</a:t>
+              <a:t>07/10/2014</a:t>
             </a:fld>
             <a:endParaRPr lang="en-IE"/>
           </a:p>
@@ -1054,7 +1054,7 @@
           <a:p>
             <a:fld id="{8A07FD79-AFFA-41E8-B5F0-0BC994AE4396}" type="datetimeFigureOut">
               <a:rPr lang="en-IE" smtClean="0"/>
-              <a:t>23/05/2014</a:t>
+              <a:t>07/10/2014</a:t>
             </a:fld>
             <a:endParaRPr lang="en-IE"/>
           </a:p>
@@ -1342,7 +1342,7 @@
           <a:p>
             <a:fld id="{8A07FD79-AFFA-41E8-B5F0-0BC994AE4396}" type="datetimeFigureOut">
               <a:rPr lang="en-IE" smtClean="0"/>
-              <a:t>23/05/2014</a:t>
+              <a:t>07/10/2014</a:t>
             </a:fld>
             <a:endParaRPr lang="en-IE"/>
           </a:p>
@@ -1764,7 +1764,7 @@
           <a:p>
             <a:fld id="{8A07FD79-AFFA-41E8-B5F0-0BC994AE4396}" type="datetimeFigureOut">
               <a:rPr lang="en-IE" smtClean="0"/>
-              <a:t>23/05/2014</a:t>
+              <a:t>07/10/2014</a:t>
             </a:fld>
             <a:endParaRPr lang="en-IE"/>
           </a:p>
@@ -1882,7 +1882,7 @@
           <a:p>
             <a:fld id="{8A07FD79-AFFA-41E8-B5F0-0BC994AE4396}" type="datetimeFigureOut">
               <a:rPr lang="en-IE" smtClean="0"/>
-              <a:t>23/05/2014</a:t>
+              <a:t>07/10/2014</a:t>
             </a:fld>
             <a:endParaRPr lang="en-IE"/>
           </a:p>
@@ -1977,7 +1977,7 @@
           <a:p>
             <a:fld id="{8A07FD79-AFFA-41E8-B5F0-0BC994AE4396}" type="datetimeFigureOut">
               <a:rPr lang="en-IE" smtClean="0"/>
-              <a:t>23/05/2014</a:t>
+              <a:t>07/10/2014</a:t>
             </a:fld>
             <a:endParaRPr lang="en-IE"/>
           </a:p>
@@ -2254,7 +2254,7 @@
           <a:p>
             <a:fld id="{8A07FD79-AFFA-41E8-B5F0-0BC994AE4396}" type="datetimeFigureOut">
               <a:rPr lang="en-IE" smtClean="0"/>
-              <a:t>23/05/2014</a:t>
+              <a:t>07/10/2014</a:t>
             </a:fld>
             <a:endParaRPr lang="en-IE"/>
           </a:p>
@@ -2507,7 +2507,7 @@
           <a:p>
             <a:fld id="{8A07FD79-AFFA-41E8-B5F0-0BC994AE4396}" type="datetimeFigureOut">
               <a:rPr lang="en-IE" smtClean="0"/>
-              <a:t>23/05/2014</a:t>
+              <a:t>07/10/2014</a:t>
             </a:fld>
             <a:endParaRPr lang="en-IE"/>
           </a:p>
@@ -2720,7 +2720,7 @@
           <a:p>
             <a:fld id="{8A07FD79-AFFA-41E8-B5F0-0BC994AE4396}" type="datetimeFigureOut">
               <a:rPr lang="en-IE" smtClean="0"/>
-              <a:t>23/05/2014</a:t>
+              <a:t>07/10/2014</a:t>
             </a:fld>
             <a:endParaRPr lang="en-IE"/>
           </a:p>
@@ -3105,6 +3105,54 @@
       </p:grpSpPr>
       <p:sp>
         <p:nvSpPr>
+          <p:cNvPr id="3" name="Rectangle 2"/>
+          <p:cNvSpPr/>
+          <p:nvPr/>
+        </p:nvSpPr>
+        <p:spPr>
+          <a:xfrm>
+            <a:off x="11784" y="548680"/>
+            <a:ext cx="9156690" cy="5832648"/>
+          </a:xfrm>
+          <a:prstGeom prst="rect">
+            <a:avLst/>
+          </a:prstGeom>
+          <a:solidFill>
+            <a:schemeClr val="bg1"/>
+          </a:solidFill>
+          <a:ln>
+            <a:solidFill>
+              <a:schemeClr val="bg1"/>
+            </a:solidFill>
+          </a:ln>
+        </p:spPr>
+        <p:style>
+          <a:lnRef idx="2">
+            <a:schemeClr val="accent1">
+              <a:shade val="50000"/>
+            </a:schemeClr>
+          </a:lnRef>
+          <a:fillRef idx="1">
+            <a:schemeClr val="accent1"/>
+          </a:fillRef>
+          <a:effectRef idx="0">
+            <a:schemeClr val="accent1"/>
+          </a:effectRef>
+          <a:fontRef idx="minor">
+            <a:schemeClr val="lt1"/>
+          </a:fontRef>
+        </p:style>
+        <p:txBody>
+          <a:bodyPr rtlCol="0" anchor="ctr"/>
+          <a:lstStyle/>
+          <a:p>
+            <a:pPr algn="ctr"/>
+            <a:endParaRPr lang="en-IE"/>
+          </a:p>
+        </p:txBody>
+      </p:sp>
+      <p:sp>
+        <p:nvSpPr>
           <p:cNvPr id="2" name="Title 1"/>
           <p:cNvSpPr>
             <a:spLocks noGrp="1"/>
@@ -3149,8 +3197,8 @@
         </p:blipFill>
         <p:spPr>
           <a:xfrm rot="284039">
-            <a:off x="117598" y="978556"/>
-            <a:ext cx="9144000" cy="2942233"/>
+            <a:off x="118226" y="1004241"/>
+            <a:ext cx="8906739" cy="2865890"/>
           </a:xfrm>
           <a:prstGeom prst="rect">
             <a:avLst/>
@@ -3179,8 +3227,8 @@
         </p:blipFill>
         <p:spPr>
           <a:xfrm rot="153700">
-            <a:off x="-24258" y="3730838"/>
-            <a:ext cx="9144000" cy="2385072"/>
+            <a:off x="122587" y="3772667"/>
+            <a:ext cx="8996219" cy="2346526"/>
           </a:xfrm>
           <a:prstGeom prst="rect">
             <a:avLst/>

</xml_diff>